<commit_message>
Updates to the flow of the powerpoint
</commit_message>
<xml_diff>
--- a/PSSaturday_template.pptx
+++ b/PSSaturday_template.pptx
@@ -5,23 +5,24 @@
     <p:sldMasterId id="2147483648" r:id="rId1"/>
   </p:sldMasterIdLst>
   <p:notesMasterIdLst>
-    <p:notesMasterId r:id="rId16"/>
+    <p:notesMasterId r:id="rId17"/>
   </p:notesMasterIdLst>
   <p:sldIdLst>
     <p:sldId id="275" r:id="rId2"/>
     <p:sldId id="268" r:id="rId3"/>
     <p:sldId id="272" r:id="rId4"/>
-    <p:sldId id="276" r:id="rId5"/>
-    <p:sldId id="277" r:id="rId6"/>
-    <p:sldId id="279" r:id="rId7"/>
-    <p:sldId id="278" r:id="rId8"/>
-    <p:sldId id="280" r:id="rId9"/>
-    <p:sldId id="281" r:id="rId10"/>
-    <p:sldId id="282" r:id="rId11"/>
-    <p:sldId id="283" r:id="rId12"/>
-    <p:sldId id="284" r:id="rId13"/>
-    <p:sldId id="285" r:id="rId14"/>
-    <p:sldId id="274" r:id="rId15"/>
+    <p:sldId id="286" r:id="rId5"/>
+    <p:sldId id="276" r:id="rId6"/>
+    <p:sldId id="277" r:id="rId7"/>
+    <p:sldId id="279" r:id="rId8"/>
+    <p:sldId id="278" r:id="rId9"/>
+    <p:sldId id="280" r:id="rId10"/>
+    <p:sldId id="281" r:id="rId11"/>
+    <p:sldId id="282" r:id="rId12"/>
+    <p:sldId id="283" r:id="rId13"/>
+    <p:sldId id="284" r:id="rId14"/>
+    <p:sldId id="285" r:id="rId15"/>
+    <p:sldId id="274" r:id="rId16"/>
   </p:sldIdLst>
   <p:sldSz cx="12192000" cy="6858000"/>
   <p:notesSz cx="6858000" cy="9144000"/>
@@ -596,7 +597,7 @@
           <a:p>
             <a:fld id="{DB967CD4-AF7B-4395-96A9-EF49BFBCD969}" type="slidenum">
               <a:rPr lang="en-US" smtClean="0"/>
-              <a:t>4</a:t>
+              <a:t>5</a:t>
             </a:fld>
             <a:endParaRPr lang="en-US"/>
           </a:p>
@@ -749,7 +750,7 @@
           <a:p>
             <a:fld id="{DB967CD4-AF7B-4395-96A9-EF49BFBCD969}" type="slidenum">
               <a:rPr lang="en-US" smtClean="0"/>
-              <a:t>5</a:t>
+              <a:t>6</a:t>
             </a:fld>
             <a:endParaRPr lang="en-US"/>
           </a:p>
@@ -869,7 +870,7 @@
           <a:p>
             <a:fld id="{DB967CD4-AF7B-4395-96A9-EF49BFBCD969}" type="slidenum">
               <a:rPr lang="en-US" smtClean="0"/>
-              <a:t>7</a:t>
+              <a:t>8</a:t>
             </a:fld>
             <a:endParaRPr lang="en-US"/>
           </a:p>
@@ -992,7 +993,7 @@
           <a:p>
             <a:fld id="{DB967CD4-AF7B-4395-96A9-EF49BFBCD969}" type="slidenum">
               <a:rPr lang="en-US" smtClean="0"/>
-              <a:t>8</a:t>
+              <a:t>9</a:t>
             </a:fld>
             <a:endParaRPr lang="en-US"/>
           </a:p>
@@ -1100,7 +1101,7 @@
           <a:p>
             <a:fld id="{DB967CD4-AF7B-4395-96A9-EF49BFBCD969}" type="slidenum">
               <a:rPr lang="en-US" smtClean="0"/>
-              <a:t>9</a:t>
+              <a:t>10</a:t>
             </a:fld>
             <a:endParaRPr lang="en-US"/>
           </a:p>
@@ -1199,7 +1200,7 @@
           <a:p>
             <a:r>
               <a:rPr lang="en-US" dirty="0"/>
-              <a:t>Show example 6</a:t>
+              <a:t>Show example 6 and 7</a:t>
             </a:r>
           </a:p>
           <a:p>
@@ -1224,7 +1225,7 @@
           <a:p>
             <a:fld id="{DB967CD4-AF7B-4395-96A9-EF49BFBCD969}" type="slidenum">
               <a:rPr lang="en-US" smtClean="0"/>
-              <a:t>10</a:t>
+              <a:t>11</a:t>
             </a:fld>
             <a:endParaRPr lang="en-US"/>
           </a:p>
@@ -1337,11 +1338,8 @@
           <a:p>
             <a:r>
               <a:rPr lang="en-US" dirty="0"/>
-              <a:t>Show example 7 then 8</a:t>
-            </a:r>
-          </a:p>
-          <a:p>
-            <a:endParaRPr lang="en-US" dirty="0"/>
+              <a:t>Show example 8 then 9</a:t>
+            </a:r>
           </a:p>
         </p:txBody>
       </p:sp>
@@ -1362,7 +1360,7 @@
           <a:p>
             <a:fld id="{DB967CD4-AF7B-4395-96A9-EF49BFBCD969}" type="slidenum">
               <a:rPr lang="en-US" smtClean="0"/>
-              <a:t>11</a:t>
+              <a:t>12</a:t>
             </a:fld>
             <a:endParaRPr lang="en-US"/>
           </a:p>
@@ -6987,7 +6985,7 @@
           <p:cNvPr id="2" name="Title 1">
             <a:extLst>
               <a:ext uri="{FF2B5EF4-FFF2-40B4-BE49-F238E27FC236}">
-                <a16:creationId xmlns:a16="http://schemas.microsoft.com/office/drawing/2014/main" id="{90D27EE9-4A89-469D-9190-A2B829BBB986}"/>
+                <a16:creationId xmlns:a16="http://schemas.microsoft.com/office/drawing/2014/main" id="{F9150E09-4378-4DEA-A704-4467823FA7ED}"/>
               </a:ext>
             </a:extLst>
           </p:cNvPr>
@@ -7005,7 +7003,7 @@
           <a:p>
             <a:r>
               <a:rPr lang="en-US" dirty="0"/>
-              <a:t>Error Variable</a:t>
+              <a:t>Catch Specific Error</a:t>
             </a:r>
           </a:p>
         </p:txBody>
@@ -7015,7 +7013,7 @@
           <p:cNvPr id="3" name="Content Placeholder 2">
             <a:extLst>
               <a:ext uri="{FF2B5EF4-FFF2-40B4-BE49-F238E27FC236}">
-                <a16:creationId xmlns:a16="http://schemas.microsoft.com/office/drawing/2014/main" id="{389FD17E-A170-4AC6-9C36-F9941684E7B4}"/>
+                <a16:creationId xmlns:a16="http://schemas.microsoft.com/office/drawing/2014/main" id="{E46290F7-21C9-498F-B739-D8C48C6F5E15}"/>
               </a:ext>
             </a:extLst>
           </p:cNvPr>
@@ -7033,7 +7031,7 @@
           <a:p>
             <a:r>
               <a:rPr lang="en-US" dirty="0"/>
-              <a:t>$Error</a:t>
+              <a:t>What do you I mean by this?</a:t>
             </a:r>
           </a:p>
           <a:p>
@@ -7042,7 +7040,16 @@
           <a:p>
             <a:r>
               <a:rPr lang="en-US" dirty="0"/>
-              <a:t>Parameter</a:t>
+              <a:t>Why would we want to do this?</a:t>
+            </a:r>
+          </a:p>
+          <a:p>
+            <a:endParaRPr lang="en-US" dirty="0"/>
+          </a:p>
+          <a:p>
+            <a:r>
+              <a:rPr lang="en-US" dirty="0"/>
+              <a:t>How do we do this?</a:t>
             </a:r>
           </a:p>
         </p:txBody>
@@ -7050,7 +7057,7 @@
     </p:spTree>
     <p:extLst>
       <p:ext uri="{BB962C8B-B14F-4D97-AF65-F5344CB8AC3E}">
-        <p14:creationId xmlns:p14="http://schemas.microsoft.com/office/powerpoint/2010/main" val="2211990505"/>
+        <p14:creationId xmlns:p14="http://schemas.microsoft.com/office/powerpoint/2010/main" val="1088245971"/>
       </p:ext>
     </p:extLst>
   </p:cSld>
@@ -7082,7 +7089,7 @@
           <p:cNvPr id="2" name="Title 1">
             <a:extLst>
               <a:ext uri="{FF2B5EF4-FFF2-40B4-BE49-F238E27FC236}">
-                <a16:creationId xmlns:a16="http://schemas.microsoft.com/office/drawing/2014/main" id="{DA426C20-5A4A-4682-A7BF-50FD139B9AA8}"/>
+                <a16:creationId xmlns:a16="http://schemas.microsoft.com/office/drawing/2014/main" id="{90D27EE9-4A89-469D-9190-A2B829BBB986}"/>
               </a:ext>
             </a:extLst>
           </p:cNvPr>
@@ -7100,7 +7107,7 @@
           <a:p>
             <a:r>
               <a:rPr lang="en-US" dirty="0"/>
-              <a:t>Gotcha</a:t>
+              <a:t>Error Variable</a:t>
             </a:r>
           </a:p>
         </p:txBody>
@@ -7110,7 +7117,7 @@
           <p:cNvPr id="3" name="Content Placeholder 2">
             <a:extLst>
               <a:ext uri="{FF2B5EF4-FFF2-40B4-BE49-F238E27FC236}">
-                <a16:creationId xmlns:a16="http://schemas.microsoft.com/office/drawing/2014/main" id="{AB635416-2632-4BAE-8C17-8DC1CAA8E4E9}"/>
+                <a16:creationId xmlns:a16="http://schemas.microsoft.com/office/drawing/2014/main" id="{389FD17E-A170-4AC6-9C36-F9941684E7B4}"/>
               </a:ext>
             </a:extLst>
           </p:cNvPr>
@@ -7128,7 +7135,7 @@
           <a:p>
             <a:r>
               <a:rPr lang="en-US" dirty="0"/>
-              <a:t>PowerShell error handling only works if the cmdlet throws an error</a:t>
+              <a:t>$Error</a:t>
             </a:r>
           </a:p>
           <a:p>
@@ -7137,32 +7144,7 @@
           <a:p>
             <a:r>
               <a:rPr lang="en-US" dirty="0"/>
-              <a:t>This prevents the correct use of </a:t>
-            </a:r>
-            <a:r>
-              <a:rPr lang="en-US" dirty="0" err="1"/>
-              <a:t>ErrorVariable</a:t>
-            </a:r>
-            <a:r>
-              <a:rPr lang="en-US" dirty="0"/>
-              <a:t> on cmdlets</a:t>
-            </a:r>
-          </a:p>
-          <a:p>
-            <a:endParaRPr lang="en-US" dirty="0"/>
-          </a:p>
-          <a:p>
-            <a:r>
-              <a:rPr lang="en-US" dirty="0"/>
-              <a:t>You can use $</a:t>
-            </a:r>
-            <a:r>
-              <a:rPr lang="en-US" dirty="0" err="1"/>
-              <a:t>PSItem</a:t>
-            </a:r>
-            <a:r>
-              <a:rPr lang="en-US" dirty="0"/>
-              <a:t> (or $_)</a:t>
+              <a:t>Parameter</a:t>
             </a:r>
           </a:p>
         </p:txBody>
@@ -7170,7 +7152,7 @@
     </p:spTree>
     <p:extLst>
       <p:ext uri="{BB962C8B-B14F-4D97-AF65-F5344CB8AC3E}">
-        <p14:creationId xmlns:p14="http://schemas.microsoft.com/office/powerpoint/2010/main" val="2860703649"/>
+        <p14:creationId xmlns:p14="http://schemas.microsoft.com/office/powerpoint/2010/main" val="2211990505"/>
       </p:ext>
     </p:extLst>
   </p:cSld>
@@ -7202,7 +7184,7 @@
           <p:cNvPr id="2" name="Title 1">
             <a:extLst>
               <a:ext uri="{FF2B5EF4-FFF2-40B4-BE49-F238E27FC236}">
-                <a16:creationId xmlns:a16="http://schemas.microsoft.com/office/drawing/2014/main" id="{597B8D53-650C-4DF7-90C7-7988B1519DDC}"/>
+                <a16:creationId xmlns:a16="http://schemas.microsoft.com/office/drawing/2014/main" id="{DA426C20-5A4A-4682-A7BF-50FD139B9AA8}"/>
               </a:ext>
             </a:extLst>
           </p:cNvPr>
@@ -7220,7 +7202,7 @@
           <a:p>
             <a:r>
               <a:rPr lang="en-US" dirty="0"/>
-              <a:t>References</a:t>
+              <a:t>Gotcha</a:t>
             </a:r>
           </a:p>
         </p:txBody>
@@ -7230,7 +7212,7 @@
           <p:cNvPr id="3" name="Content Placeholder 2">
             <a:extLst>
               <a:ext uri="{FF2B5EF4-FFF2-40B4-BE49-F238E27FC236}">
-                <a16:creationId xmlns:a16="http://schemas.microsoft.com/office/drawing/2014/main" id="{291D2074-2526-4CA8-B90F-A450FB23FBBD}"/>
+                <a16:creationId xmlns:a16="http://schemas.microsoft.com/office/drawing/2014/main" id="{AB635416-2632-4BAE-8C17-8DC1CAA8E4E9}"/>
               </a:ext>
             </a:extLst>
           </p:cNvPr>
@@ -7243,92 +7225,54 @@
         </p:nvSpPr>
         <p:spPr/>
         <p:txBody>
-          <a:bodyPr>
-            <a:normAutofit fontScale="85000" lnSpcReduction="20000"/>
-          </a:bodyPr>
+          <a:bodyPr/>
           <a:lstStyle/>
           <a:p>
             <a:r>
-              <a:rPr lang="en-US" b="1" dirty="0"/>
-              <a:t>Understanding the Try/Catch Block in PowerShell by Adam Bertram </a:t>
-            </a:r>
-            <a:r>
-              <a:rPr lang="en-US" dirty="0">
-                <a:hlinkClick r:id="rId2"/>
-              </a:rPr>
-              <a:t>https://mcpmag.com/articles/2016/08/18/try-catch-block-in-powershell.aspx</a:t>
-            </a:r>
+              <a:rPr lang="en-US" dirty="0"/>
+              <a:t>PowerShell error handling only works if the cmdlet throws an error</a:t>
+            </a:r>
+          </a:p>
+          <a:p>
             <a:endParaRPr lang="en-US" dirty="0"/>
           </a:p>
           <a:p>
             <a:r>
-              <a:rPr lang="en-US" b="1" dirty="0"/>
-              <a:t>PowerShell: Everything you wanted to know about exceptions by Kevin Marquette </a:t>
-            </a:r>
-            <a:r>
-              <a:rPr lang="en-US" dirty="0">
-                <a:hlinkClick r:id="rId3"/>
-              </a:rPr>
-              <a:t>https://kevinmarquette.github.io/2017-04-10-Powershell-exceptions-everything-you-ever-wanted-to-know/</a:t>
-            </a:r>
+              <a:rPr lang="en-US" dirty="0"/>
+              <a:t>This prevents the correct use of </a:t>
+            </a:r>
+            <a:r>
+              <a:rPr lang="en-US" dirty="0" err="1"/>
+              <a:t>ErrorVariable</a:t>
+            </a:r>
+            <a:r>
+              <a:rPr lang="en-US" dirty="0"/>
+              <a:t> on cmdlets</a:t>
+            </a:r>
+          </a:p>
+          <a:p>
             <a:endParaRPr lang="en-US" dirty="0"/>
           </a:p>
           <a:p>
             <a:r>
-              <a:rPr lang="en-US" b="1" dirty="0" err="1"/>
-              <a:t>About_Throw</a:t>
-            </a:r>
-            <a:r>
-              <a:rPr lang="en-US" b="1" dirty="0"/>
-              <a:t> </a:t>
-            </a:r>
-            <a:r>
-              <a:rPr lang="en-US" dirty="0">
-                <a:hlinkClick r:id="rId4"/>
-              </a:rPr>
-              <a:t>https://docs.microsoft.com/en-us/powershell/module/microsoft.powershell.core/about/about_throw?view=powershell-6</a:t>
-            </a:r>
-            <a:endParaRPr lang="en-US" dirty="0"/>
-          </a:p>
-          <a:p>
-            <a:r>
-              <a:rPr lang="en-US" b="1" dirty="0"/>
-              <a:t>Error Handing by Margaret Rouse</a:t>
-            </a:r>
-            <a:r>
               <a:rPr lang="en-US" dirty="0"/>
-              <a:t> </a:t>
-            </a:r>
-            <a:r>
-              <a:rPr lang="en-US" dirty="0">
-                <a:hlinkClick r:id="rId5"/>
-              </a:rPr>
-              <a:t>https://searchsoftwarequality.techtarget.com/definition/error-handling</a:t>
-            </a:r>
-            <a:endParaRPr lang="en-US" dirty="0"/>
-          </a:p>
-          <a:p>
-            <a:r>
-              <a:rPr lang="en-US" b="1" dirty="0"/>
-              <a:t>An Introduction to Error Handling in PowerShell </a:t>
-            </a:r>
-            <a:r>
-              <a:rPr lang="en-US" dirty="0">
-                <a:hlinkClick r:id="rId6"/>
-              </a:rPr>
-              <a:t>https://blogs.msdn.microsoft.com/kebab/2013/06/09/an-introduction-to-error-handling-in-powershell/</a:t>
-            </a:r>
-            <a:endParaRPr lang="en-US" dirty="0"/>
-          </a:p>
-          <a:p>
-            <a:endParaRPr lang="en-US" dirty="0"/>
+              <a:t>You can use $</a:t>
+            </a:r>
+            <a:r>
+              <a:rPr lang="en-US" dirty="0" err="1"/>
+              <a:t>PSItem</a:t>
+            </a:r>
+            <a:r>
+              <a:rPr lang="en-US" dirty="0"/>
+              <a:t> (or $_)</a:t>
+            </a:r>
           </a:p>
         </p:txBody>
       </p:sp>
     </p:spTree>
     <p:extLst>
       <p:ext uri="{BB962C8B-B14F-4D97-AF65-F5344CB8AC3E}">
-        <p14:creationId xmlns:p14="http://schemas.microsoft.com/office/powerpoint/2010/main" val="3352098437"/>
+        <p14:creationId xmlns:p14="http://schemas.microsoft.com/office/powerpoint/2010/main" val="2860703649"/>
       </p:ext>
     </p:extLst>
   </p:cSld>
@@ -7360,6 +7304,177 @@
           <p:cNvPr id="2" name="Title 1">
             <a:extLst>
               <a:ext uri="{FF2B5EF4-FFF2-40B4-BE49-F238E27FC236}">
+                <a16:creationId xmlns:a16="http://schemas.microsoft.com/office/drawing/2014/main" id="{597B8D53-650C-4DF7-90C7-7988B1519DDC}"/>
+              </a:ext>
+            </a:extLst>
+          </p:cNvPr>
+          <p:cNvSpPr>
+            <a:spLocks noGrp="1"/>
+          </p:cNvSpPr>
+          <p:nvPr>
+            <p:ph type="title"/>
+          </p:nvPr>
+        </p:nvSpPr>
+        <p:spPr/>
+        <p:txBody>
+          <a:bodyPr/>
+          <a:lstStyle/>
+          <a:p>
+            <a:r>
+              <a:rPr lang="en-US" dirty="0"/>
+              <a:t>References</a:t>
+            </a:r>
+          </a:p>
+        </p:txBody>
+      </p:sp>
+      <p:sp>
+        <p:nvSpPr>
+          <p:cNvPr id="3" name="Content Placeholder 2">
+            <a:extLst>
+              <a:ext uri="{FF2B5EF4-FFF2-40B4-BE49-F238E27FC236}">
+                <a16:creationId xmlns:a16="http://schemas.microsoft.com/office/drawing/2014/main" id="{291D2074-2526-4CA8-B90F-A450FB23FBBD}"/>
+              </a:ext>
+            </a:extLst>
+          </p:cNvPr>
+          <p:cNvSpPr>
+            <a:spLocks noGrp="1"/>
+          </p:cNvSpPr>
+          <p:nvPr>
+            <p:ph idx="1"/>
+          </p:nvPr>
+        </p:nvSpPr>
+        <p:spPr/>
+        <p:txBody>
+          <a:bodyPr>
+            <a:normAutofit fontScale="70000" lnSpcReduction="20000"/>
+          </a:bodyPr>
+          <a:lstStyle/>
+          <a:p>
+            <a:r>
+              <a:rPr lang="en-US" b="1" dirty="0"/>
+              <a:t>Understanding the Try/Catch Block in PowerShell by Adam Bertram </a:t>
+            </a:r>
+            <a:r>
+              <a:rPr lang="en-US" dirty="0">
+                <a:hlinkClick r:id="rId2"/>
+              </a:rPr>
+              <a:t>https://mcpmag.com/articles/2016/08/18/try-catch-block-in-powershell.aspx</a:t>
+            </a:r>
+            <a:endParaRPr lang="en-US" dirty="0"/>
+          </a:p>
+          <a:p>
+            <a:r>
+              <a:rPr lang="en-US" b="1" dirty="0"/>
+              <a:t>PowerShell: Everything you wanted to know about exceptions by Kevin Marquette </a:t>
+            </a:r>
+            <a:r>
+              <a:rPr lang="en-US" dirty="0">
+                <a:hlinkClick r:id="rId3"/>
+              </a:rPr>
+              <a:t>https://kevinmarquette.github.io/2017-04-10-Powershell-exceptions-everything-you-ever-wanted-to-know/</a:t>
+            </a:r>
+            <a:endParaRPr lang="en-US" dirty="0"/>
+          </a:p>
+          <a:p>
+            <a:r>
+              <a:rPr lang="en-US" b="1" dirty="0" err="1"/>
+              <a:t>About_Throw</a:t>
+            </a:r>
+            <a:r>
+              <a:rPr lang="en-US" b="1" dirty="0"/>
+              <a:t> </a:t>
+            </a:r>
+            <a:r>
+              <a:rPr lang="en-US" dirty="0">
+                <a:hlinkClick r:id="rId4"/>
+              </a:rPr>
+              <a:t>https://docs.microsoft.com/en-us/powershell/module/microsoft.powershell.core/about/about_throw?view=powershell-6</a:t>
+            </a:r>
+            <a:endParaRPr lang="en-US" dirty="0"/>
+          </a:p>
+          <a:p>
+            <a:r>
+              <a:rPr lang="en-US" b="1" dirty="0"/>
+              <a:t>Error Handing by Margaret Rouse</a:t>
+            </a:r>
+            <a:r>
+              <a:rPr lang="en-US" dirty="0"/>
+              <a:t> </a:t>
+            </a:r>
+            <a:r>
+              <a:rPr lang="en-US" dirty="0">
+                <a:hlinkClick r:id="rId5"/>
+              </a:rPr>
+              <a:t>https://searchsoftwarequality.techtarget.com/definition/error-handling</a:t>
+            </a:r>
+            <a:endParaRPr lang="en-US" dirty="0"/>
+          </a:p>
+          <a:p>
+            <a:r>
+              <a:rPr lang="en-US" b="1" dirty="0"/>
+              <a:t>An Introduction to Error Handling in PowerShell </a:t>
+            </a:r>
+            <a:r>
+              <a:rPr lang="en-US" dirty="0">
+                <a:hlinkClick r:id="rId6"/>
+              </a:rPr>
+              <a:t>https://blogs.msdn.microsoft.com/kebab/2013/06/09/an-introduction-to-error-handling-in-powershell/</a:t>
+            </a:r>
+            <a:endParaRPr lang="en-US" dirty="0"/>
+          </a:p>
+          <a:p>
+            <a:r>
+              <a:rPr lang="en-US" b="1" dirty="0"/>
+              <a:t>HOWTO: Find Specific Exceptions to Use with Try/Catch in PowerShell </a:t>
+            </a:r>
+            <a:r>
+              <a:rPr lang="en-US" dirty="0">
+                <a:hlinkClick r:id="rId7"/>
+              </a:rPr>
+              <a:t>https://pleasework.robbievance.net/howto-find-specific-exceptions-to-use-with-trycatch-in-powershell/</a:t>
+            </a:r>
+            <a:endParaRPr lang="en-US" dirty="0"/>
+          </a:p>
+          <a:p>
+            <a:endParaRPr lang="en-US" dirty="0"/>
+          </a:p>
+        </p:txBody>
+      </p:sp>
+    </p:spTree>
+    <p:extLst>
+      <p:ext uri="{BB962C8B-B14F-4D97-AF65-F5344CB8AC3E}">
+        <p14:creationId xmlns:p14="http://schemas.microsoft.com/office/powerpoint/2010/main" val="3352098437"/>
+      </p:ext>
+    </p:extLst>
+  </p:cSld>
+  <p:clrMapOvr>
+    <a:masterClrMapping/>
+  </p:clrMapOvr>
+</p:sld>
+</file>
+
+<file path=ppt/slides/slide14.xml><?xml version="1.0" encoding="utf-8"?>
+<p:sld xmlns:a="http://schemas.openxmlformats.org/drawingml/2006/main" xmlns:r="http://schemas.openxmlformats.org/officeDocument/2006/relationships" xmlns:p="http://schemas.openxmlformats.org/presentationml/2006/main">
+  <p:cSld>
+    <p:spTree>
+      <p:nvGrpSpPr>
+        <p:cNvPr id="1" name=""/>
+        <p:cNvGrpSpPr/>
+        <p:nvPr/>
+      </p:nvGrpSpPr>
+      <p:grpSpPr>
+        <a:xfrm>
+          <a:off x="0" y="0"/>
+          <a:ext cx="0" cy="0"/>
+          <a:chOff x="0" y="0"/>
+          <a:chExt cx="0" cy="0"/>
+        </a:xfrm>
+      </p:grpSpPr>
+      <p:sp>
+        <p:nvSpPr>
+          <p:cNvPr id="2" name="Title 1">
+            <a:extLst>
+              <a:ext uri="{FF2B5EF4-FFF2-40B4-BE49-F238E27FC236}">
                 <a16:creationId xmlns:a16="http://schemas.microsoft.com/office/drawing/2014/main" id="{EF056948-3C1A-442D-BD13-F8FD4774F735}"/>
               </a:ext>
             </a:extLst>
@@ -7430,7 +7545,7 @@
 </p:sld>
 </file>
 
-<file path=ppt/slides/slide14.xml><?xml version="1.0" encoding="utf-8"?>
+<file path=ppt/slides/slide15.xml><?xml version="1.0" encoding="utf-8"?>
 <p:sld xmlns:a="http://schemas.openxmlformats.org/drawingml/2006/main" xmlns:r="http://schemas.openxmlformats.org/officeDocument/2006/relationships" xmlns:p="http://schemas.openxmlformats.org/presentationml/2006/main">
   <p:cSld>
     <p:spTree>
@@ -8466,7 +8581,7 @@
           <p:cNvPr id="2" name="Title 1">
             <a:extLst>
               <a:ext uri="{FF2B5EF4-FFF2-40B4-BE49-F238E27FC236}">
-                <a16:creationId xmlns:a16="http://schemas.microsoft.com/office/drawing/2014/main" id="{05CBD600-6E92-4EEE-8891-C365AB0D830F}"/>
+                <a16:creationId xmlns:a16="http://schemas.microsoft.com/office/drawing/2014/main" id="{FBF985CA-722B-4CA8-9CA9-BC0C8CCDC90E}"/>
               </a:ext>
             </a:extLst>
           </p:cNvPr>
@@ -8484,7 +8599,7 @@
           <a:p>
             <a:r>
               <a:rPr lang="en-US" dirty="0"/>
-              <a:t>Why we do it?</a:t>
+              <a:t>Reason I came up with this season</a:t>
             </a:r>
           </a:p>
         </p:txBody>
@@ -8494,7 +8609,7 @@
           <p:cNvPr id="3" name="Content Placeholder 2">
             <a:extLst>
               <a:ext uri="{FF2B5EF4-FFF2-40B4-BE49-F238E27FC236}">
-                <a16:creationId xmlns:a16="http://schemas.microsoft.com/office/drawing/2014/main" id="{75ED07A5-4C02-4145-B67B-EF4568AECFAD}"/>
+                <a16:creationId xmlns:a16="http://schemas.microsoft.com/office/drawing/2014/main" id="{413C73CF-AB22-4329-B391-5AA10C9ABA16}"/>
               </a:ext>
             </a:extLst>
           </p:cNvPr>
@@ -8512,7 +8627,7 @@
           <a:p>
             <a:r>
               <a:rPr lang="en-US" dirty="0"/>
-              <a:t>A working script may not always work</a:t>
+              <a:t>I don’t want to talk about it</a:t>
             </a:r>
           </a:p>
           <a:p>
@@ -8521,16 +8636,11 @@
           <a:p>
             <a:r>
               <a:rPr lang="en-US" dirty="0"/>
-              <a:t>Alert support there is an issue</a:t>
-            </a:r>
-          </a:p>
-          <a:p>
-            <a:endParaRPr lang="en-US" dirty="0"/>
-          </a:p>
-          <a:p>
-            <a:r>
-              <a:rPr lang="en-US" dirty="0"/>
-              <a:t>Attempt to resolve</a:t>
+              <a:t>#NeverForgetProdDatabaseTableNumberFourCirca2018 #</a:t>
+            </a:r>
+            <a:r>
+              <a:rPr lang="en-US"/>
+              <a:t>InterventionWithManger</a:t>
             </a:r>
           </a:p>
         </p:txBody>
@@ -8538,7 +8648,7 @@
     </p:spTree>
     <p:extLst>
       <p:ext uri="{BB962C8B-B14F-4D97-AF65-F5344CB8AC3E}">
-        <p14:creationId xmlns:p14="http://schemas.microsoft.com/office/powerpoint/2010/main" val="759103278"/>
+        <p14:creationId xmlns:p14="http://schemas.microsoft.com/office/powerpoint/2010/main" val="3392389419"/>
       </p:ext>
     </p:extLst>
   </p:cSld>
@@ -8570,7 +8680,7 @@
           <p:cNvPr id="2" name="Title 1">
             <a:extLst>
               <a:ext uri="{FF2B5EF4-FFF2-40B4-BE49-F238E27FC236}">
-                <a16:creationId xmlns:a16="http://schemas.microsoft.com/office/drawing/2014/main" id="{FC5B49EC-3123-4FCA-81FC-ED6C4B2314EB}"/>
+                <a16:creationId xmlns:a16="http://schemas.microsoft.com/office/drawing/2014/main" id="{05CBD600-6E92-4EEE-8891-C365AB0D830F}"/>
               </a:ext>
             </a:extLst>
           </p:cNvPr>
@@ -8588,7 +8698,7 @@
           <a:p>
             <a:r>
               <a:rPr lang="en-US" dirty="0"/>
-              <a:t>Error Handling</a:t>
+              <a:t>Why we do it?</a:t>
             </a:r>
           </a:p>
         </p:txBody>
@@ -8598,7 +8708,7 @@
           <p:cNvPr id="3" name="Content Placeholder 2">
             <a:extLst>
               <a:ext uri="{FF2B5EF4-FFF2-40B4-BE49-F238E27FC236}">
-                <a16:creationId xmlns:a16="http://schemas.microsoft.com/office/drawing/2014/main" id="{EFDA08EB-0D4D-4960-9B72-CF82EC3FD3FC}"/>
+                <a16:creationId xmlns:a16="http://schemas.microsoft.com/office/drawing/2014/main" id="{75ED07A5-4C02-4145-B67B-EF4568AECFAD}"/>
               </a:ext>
             </a:extLst>
           </p:cNvPr>
@@ -8616,7 +8726,7 @@
           <a:p>
             <a:r>
               <a:rPr lang="en-US" dirty="0"/>
-              <a:t>Anticipation</a:t>
+              <a:t>A working script may not always work</a:t>
             </a:r>
           </a:p>
           <a:p>
@@ -8625,7 +8735,7 @@
           <a:p>
             <a:r>
               <a:rPr lang="en-US" dirty="0"/>
-              <a:t>Detection</a:t>
+              <a:t>Alert support there is an issue</a:t>
             </a:r>
           </a:p>
           <a:p>
@@ -8634,7 +8744,7 @@
           <a:p>
             <a:r>
               <a:rPr lang="en-US" dirty="0"/>
-              <a:t>Resolution</a:t>
+              <a:t>Attempt to resolve</a:t>
             </a:r>
           </a:p>
         </p:txBody>
@@ -8642,7 +8752,7 @@
     </p:spTree>
     <p:extLst>
       <p:ext uri="{BB962C8B-B14F-4D97-AF65-F5344CB8AC3E}">
-        <p14:creationId xmlns:p14="http://schemas.microsoft.com/office/powerpoint/2010/main" val="1286304670"/>
+        <p14:creationId xmlns:p14="http://schemas.microsoft.com/office/powerpoint/2010/main" val="759103278"/>
       </p:ext>
     </p:extLst>
   </p:cSld>
@@ -8674,7 +8784,7 @@
           <p:cNvPr id="2" name="Title 1">
             <a:extLst>
               <a:ext uri="{FF2B5EF4-FFF2-40B4-BE49-F238E27FC236}">
-                <a16:creationId xmlns:a16="http://schemas.microsoft.com/office/drawing/2014/main" id="{67B07679-EA92-43AE-A37D-6EBBE8B368E2}"/>
+                <a16:creationId xmlns:a16="http://schemas.microsoft.com/office/drawing/2014/main" id="{FC5B49EC-3123-4FCA-81FC-ED6C4B2314EB}"/>
               </a:ext>
             </a:extLst>
           </p:cNvPr>
@@ -8692,50 +8802,61 @@
           <a:p>
             <a:r>
               <a:rPr lang="en-US" dirty="0"/>
-              <a:t>Obligatory Meme</a:t>
-            </a:r>
-          </a:p>
-        </p:txBody>
-      </p:sp>
-      <p:pic>
-        <p:nvPicPr>
-          <p:cNvPr id="5" name="Content Placeholder 4">
-            <a:extLst>
-              <a:ext uri="{FF2B5EF4-FFF2-40B4-BE49-F238E27FC236}">
-                <a16:creationId xmlns:a16="http://schemas.microsoft.com/office/drawing/2014/main" id="{AA63F5C5-2E79-4B2F-B663-AE3A0AEC3F16}"/>
-              </a:ext>
-            </a:extLst>
-          </p:cNvPr>
-          <p:cNvPicPr>
-            <a:picLocks noGrp="1" noChangeAspect="1"/>
-          </p:cNvPicPr>
+              <a:t>Error Handling</a:t>
+            </a:r>
+          </a:p>
+        </p:txBody>
+      </p:sp>
+      <p:sp>
+        <p:nvSpPr>
+          <p:cNvPr id="3" name="Content Placeholder 2">
+            <a:extLst>
+              <a:ext uri="{FF2B5EF4-FFF2-40B4-BE49-F238E27FC236}">
+                <a16:creationId xmlns:a16="http://schemas.microsoft.com/office/drawing/2014/main" id="{EFDA08EB-0D4D-4960-9B72-CF82EC3FD3FC}"/>
+              </a:ext>
+            </a:extLst>
+          </p:cNvPr>
+          <p:cNvSpPr>
+            <a:spLocks noGrp="1"/>
+          </p:cNvSpPr>
           <p:nvPr>
             <p:ph idx="1"/>
           </p:nvPr>
-        </p:nvPicPr>
-        <p:blipFill>
-          <a:blip r:embed="rId2">
-            <a:extLst>
-              <a:ext uri="{28A0092B-C50C-407E-A947-70E740481C1C}">
-                <a14:useLocalDpi xmlns:a14="http://schemas.microsoft.com/office/drawing/2010/main" val="0"/>
-              </a:ext>
-            </a:extLst>
-          </a:blip>
-          <a:stretch>
-            <a:fillRect/>
-          </a:stretch>
-        </p:blipFill>
-        <p:spPr>
-          <a:xfrm>
-            <a:off x="3920331" y="1825625"/>
-            <a:ext cx="4351338" cy="4351338"/>
-          </a:xfrm>
-        </p:spPr>
-      </p:pic>
+        </p:nvSpPr>
+        <p:spPr/>
+        <p:txBody>
+          <a:bodyPr/>
+          <a:lstStyle/>
+          <a:p>
+            <a:r>
+              <a:rPr lang="en-US" dirty="0"/>
+              <a:t>Anticipation</a:t>
+            </a:r>
+          </a:p>
+          <a:p>
+            <a:endParaRPr lang="en-US" dirty="0"/>
+          </a:p>
+          <a:p>
+            <a:r>
+              <a:rPr lang="en-US" dirty="0"/>
+              <a:t>Detection</a:t>
+            </a:r>
+          </a:p>
+          <a:p>
+            <a:endParaRPr lang="en-US" dirty="0"/>
+          </a:p>
+          <a:p>
+            <a:r>
+              <a:rPr lang="en-US" dirty="0"/>
+              <a:t>Resolution</a:t>
+            </a:r>
+          </a:p>
+        </p:txBody>
+      </p:sp>
     </p:spTree>
     <p:extLst>
       <p:ext uri="{BB962C8B-B14F-4D97-AF65-F5344CB8AC3E}">
-        <p14:creationId xmlns:p14="http://schemas.microsoft.com/office/powerpoint/2010/main" val="1650017935"/>
+        <p14:creationId xmlns:p14="http://schemas.microsoft.com/office/powerpoint/2010/main" val="1286304670"/>
       </p:ext>
     </p:extLst>
   </p:cSld>
@@ -8767,7 +8888,7 @@
           <p:cNvPr id="2" name="Title 1">
             <a:extLst>
               <a:ext uri="{FF2B5EF4-FFF2-40B4-BE49-F238E27FC236}">
-                <a16:creationId xmlns:a16="http://schemas.microsoft.com/office/drawing/2014/main" id="{6C4258C3-DCE2-4C1E-9829-A87ECD46C25F}"/>
+                <a16:creationId xmlns:a16="http://schemas.microsoft.com/office/drawing/2014/main" id="{67B07679-EA92-43AE-A37D-6EBBE8B368E2}"/>
               </a:ext>
             </a:extLst>
           </p:cNvPr>
@@ -8785,64 +8906,50 @@
           <a:p>
             <a:r>
               <a:rPr lang="en-US" dirty="0"/>
-              <a:t>Try/Catch</a:t>
-            </a:r>
-          </a:p>
-        </p:txBody>
-      </p:sp>
-      <p:sp>
-        <p:nvSpPr>
-          <p:cNvPr id="3" name="Content Placeholder 2">
-            <a:extLst>
-              <a:ext uri="{FF2B5EF4-FFF2-40B4-BE49-F238E27FC236}">
-                <a16:creationId xmlns:a16="http://schemas.microsoft.com/office/drawing/2014/main" id="{CBC0F9B9-2729-4BE9-ADB4-86ADF2FC18B5}"/>
-              </a:ext>
-            </a:extLst>
-          </p:cNvPr>
-          <p:cNvSpPr>
-            <a:spLocks noGrp="1"/>
-          </p:cNvSpPr>
+              <a:t>Obligatory Meme</a:t>
+            </a:r>
+          </a:p>
+        </p:txBody>
+      </p:sp>
+      <p:pic>
+        <p:nvPicPr>
+          <p:cNvPr id="5" name="Content Placeholder 4">
+            <a:extLst>
+              <a:ext uri="{FF2B5EF4-FFF2-40B4-BE49-F238E27FC236}">
+                <a16:creationId xmlns:a16="http://schemas.microsoft.com/office/drawing/2014/main" id="{AA63F5C5-2E79-4B2F-B663-AE3A0AEC3F16}"/>
+              </a:ext>
+            </a:extLst>
+          </p:cNvPr>
+          <p:cNvPicPr>
+            <a:picLocks noGrp="1" noChangeAspect="1"/>
+          </p:cNvPicPr>
           <p:nvPr>
             <p:ph idx="1"/>
           </p:nvPr>
-        </p:nvSpPr>
-        <p:spPr/>
-        <p:txBody>
-          <a:bodyPr/>
-          <a:lstStyle/>
-          <a:p>
-            <a:r>
-              <a:rPr lang="en-US" dirty="0"/>
-              <a:t>The simplest way to handle errors.</a:t>
-            </a:r>
-          </a:p>
-          <a:p>
-            <a:endParaRPr lang="en-US" dirty="0"/>
-          </a:p>
-          <a:p>
-            <a:r>
-              <a:rPr lang="en-US" dirty="0"/>
-              <a:t>Think of this as a safety net</a:t>
-            </a:r>
-          </a:p>
-          <a:p>
-            <a:pPr marL="0" indent="0">
-              <a:buNone/>
-            </a:pPr>
-            <a:endParaRPr lang="en-US" dirty="0"/>
-          </a:p>
-          <a:p>
-            <a:r>
-              <a:rPr lang="en-US" dirty="0"/>
-              <a:t>Keep the try block small</a:t>
-            </a:r>
-          </a:p>
-        </p:txBody>
-      </p:sp>
+        </p:nvPicPr>
+        <p:blipFill>
+          <a:blip r:embed="rId2">
+            <a:extLst>
+              <a:ext uri="{28A0092B-C50C-407E-A947-70E740481C1C}">
+                <a14:useLocalDpi xmlns:a14="http://schemas.microsoft.com/office/drawing/2010/main" val="0"/>
+              </a:ext>
+            </a:extLst>
+          </a:blip>
+          <a:stretch>
+            <a:fillRect/>
+          </a:stretch>
+        </p:blipFill>
+        <p:spPr>
+          <a:xfrm>
+            <a:off x="3920331" y="1825625"/>
+            <a:ext cx="4351338" cy="4351338"/>
+          </a:xfrm>
+        </p:spPr>
+      </p:pic>
     </p:spTree>
     <p:extLst>
       <p:ext uri="{BB962C8B-B14F-4D97-AF65-F5344CB8AC3E}">
-        <p14:creationId xmlns:p14="http://schemas.microsoft.com/office/powerpoint/2010/main" val="3085934346"/>
+        <p14:creationId xmlns:p14="http://schemas.microsoft.com/office/powerpoint/2010/main" val="1650017935"/>
       </p:ext>
     </p:extLst>
   </p:cSld>
@@ -8874,7 +8981,7 @@
           <p:cNvPr id="2" name="Title 1">
             <a:extLst>
               <a:ext uri="{FF2B5EF4-FFF2-40B4-BE49-F238E27FC236}">
-                <a16:creationId xmlns:a16="http://schemas.microsoft.com/office/drawing/2014/main" id="{DF56FAF3-68DE-4664-A8C9-BE269611AFD5}"/>
+                <a16:creationId xmlns:a16="http://schemas.microsoft.com/office/drawing/2014/main" id="{6C4258C3-DCE2-4C1E-9829-A87ECD46C25F}"/>
               </a:ext>
             </a:extLst>
           </p:cNvPr>
@@ -8892,7 +8999,7 @@
           <a:p>
             <a:r>
               <a:rPr lang="en-US" dirty="0"/>
-              <a:t>Force a catch</a:t>
+              <a:t>Try/Catch</a:t>
             </a:r>
           </a:p>
         </p:txBody>
@@ -8902,7 +9009,7 @@
           <p:cNvPr id="3" name="Content Placeholder 2">
             <a:extLst>
               <a:ext uri="{FF2B5EF4-FFF2-40B4-BE49-F238E27FC236}">
-                <a16:creationId xmlns:a16="http://schemas.microsoft.com/office/drawing/2014/main" id="{F777CF46-633F-4189-AEB2-94241E81FF35}"/>
+                <a16:creationId xmlns:a16="http://schemas.microsoft.com/office/drawing/2014/main" id="{CBC0F9B9-2729-4BE9-ADB4-86ADF2FC18B5}"/>
               </a:ext>
             </a:extLst>
           </p:cNvPr>
@@ -8920,7 +9027,7 @@
           <a:p>
             <a:r>
               <a:rPr lang="en-US" dirty="0"/>
-              <a:t>The keyword is throw</a:t>
+              <a:t>The simplest way to handle errors.</a:t>
             </a:r>
           </a:p>
           <a:p>
@@ -8929,25 +9036,19 @@
           <a:p>
             <a:r>
               <a:rPr lang="en-US" dirty="0"/>
-              <a:t>Throw triggers a generic error</a:t>
-            </a:r>
-          </a:p>
-          <a:p>
+              <a:t>Think of this as a safety net</a:t>
+            </a:r>
+          </a:p>
+          <a:p>
+            <a:pPr marL="0" indent="0">
+              <a:buNone/>
+            </a:pPr>
             <a:endParaRPr lang="en-US" dirty="0"/>
           </a:p>
           <a:p>
             <a:r>
               <a:rPr lang="en-US" dirty="0"/>
-              <a:t>Add a message for the error</a:t>
-            </a:r>
-          </a:p>
-          <a:p>
-            <a:endParaRPr lang="en-US" dirty="0"/>
-          </a:p>
-          <a:p>
-            <a:r>
-              <a:rPr lang="en-US" dirty="0"/>
-              <a:t>An alternative would be to use Write-Error</a:t>
+              <a:t>Keep the try block small</a:t>
             </a:r>
           </a:p>
         </p:txBody>
@@ -8955,7 +9056,7 @@
     </p:spTree>
     <p:extLst>
       <p:ext uri="{BB962C8B-B14F-4D97-AF65-F5344CB8AC3E}">
-        <p14:creationId xmlns:p14="http://schemas.microsoft.com/office/powerpoint/2010/main" val="1866631082"/>
+        <p14:creationId xmlns:p14="http://schemas.microsoft.com/office/powerpoint/2010/main" val="3085934346"/>
       </p:ext>
     </p:extLst>
   </p:cSld>
@@ -8987,7 +9088,7 @@
           <p:cNvPr id="2" name="Title 1">
             <a:extLst>
               <a:ext uri="{FF2B5EF4-FFF2-40B4-BE49-F238E27FC236}">
-                <a16:creationId xmlns:a16="http://schemas.microsoft.com/office/drawing/2014/main" id="{F9150E09-4378-4DEA-A704-4467823FA7ED}"/>
+                <a16:creationId xmlns:a16="http://schemas.microsoft.com/office/drawing/2014/main" id="{DF56FAF3-68DE-4664-A8C9-BE269611AFD5}"/>
               </a:ext>
             </a:extLst>
           </p:cNvPr>
@@ -9005,7 +9106,7 @@
           <a:p>
             <a:r>
               <a:rPr lang="en-US" dirty="0"/>
-              <a:t>Catch Specific Error</a:t>
+              <a:t>Force a catch</a:t>
             </a:r>
           </a:p>
         </p:txBody>
@@ -9015,7 +9116,7 @@
           <p:cNvPr id="3" name="Content Placeholder 2">
             <a:extLst>
               <a:ext uri="{FF2B5EF4-FFF2-40B4-BE49-F238E27FC236}">
-                <a16:creationId xmlns:a16="http://schemas.microsoft.com/office/drawing/2014/main" id="{E46290F7-21C9-498F-B739-D8C48C6F5E15}"/>
+                <a16:creationId xmlns:a16="http://schemas.microsoft.com/office/drawing/2014/main" id="{F777CF46-633F-4189-AEB2-94241E81FF35}"/>
               </a:ext>
             </a:extLst>
           </p:cNvPr>
@@ -9033,7 +9134,7 @@
           <a:p>
             <a:r>
               <a:rPr lang="en-US" dirty="0"/>
-              <a:t>What do you I mean by this?</a:t>
+              <a:t>The keyword is throw</a:t>
             </a:r>
           </a:p>
           <a:p>
@@ -9042,7 +9143,7 @@
           <a:p>
             <a:r>
               <a:rPr lang="en-US" dirty="0"/>
-              <a:t>Why would we want to do this?</a:t>
+              <a:t>Throw triggers a generic error</a:t>
             </a:r>
           </a:p>
           <a:p>
@@ -9051,7 +9152,16 @@
           <a:p>
             <a:r>
               <a:rPr lang="en-US" dirty="0"/>
-              <a:t>How do we do this?</a:t>
+              <a:t>Add a message for the error</a:t>
+            </a:r>
+          </a:p>
+          <a:p>
+            <a:endParaRPr lang="en-US" dirty="0"/>
+          </a:p>
+          <a:p>
+            <a:r>
+              <a:rPr lang="en-US" dirty="0"/>
+              <a:t>An alternative would be to use Write-Error</a:t>
             </a:r>
           </a:p>
         </p:txBody>
@@ -9059,7 +9169,7 @@
     </p:spTree>
     <p:extLst>
       <p:ext uri="{BB962C8B-B14F-4D97-AF65-F5344CB8AC3E}">
-        <p14:creationId xmlns:p14="http://schemas.microsoft.com/office/powerpoint/2010/main" val="1088245971"/>
+        <p14:creationId xmlns:p14="http://schemas.microsoft.com/office/powerpoint/2010/main" val="1866631082"/>
       </p:ext>
     </p:extLst>
   </p:cSld>

</xml_diff>

<commit_message>
Minor edits from RTPSUG Saturday
</commit_message>
<xml_diff>
--- a/PSSaturday_template.pptx
+++ b/PSSaturday_template.pptx
@@ -222,7 +222,7 @@
           <a:p>
             <a:fld id="{113DB8EC-E6BA-4F2A-B4A6-5B4BBCFFA431}" type="datetimeFigureOut">
               <a:rPr lang="en-US" smtClean="0"/>
-              <a:t>9/19/2019</a:t>
+              <a:t>9/21/2019</a:t>
             </a:fld>
             <a:endParaRPr lang="en-US"/>
           </a:p>
@@ -1526,7 +1526,7 @@
           <a:p>
             <a:fld id="{A8B89F18-586E-4B97-8EEA-25E99A190A89}" type="datetimeFigureOut">
               <a:rPr lang="en-US" smtClean="0"/>
-              <a:t>9/19/2019</a:t>
+              <a:t>9/21/2019</a:t>
             </a:fld>
             <a:endParaRPr lang="en-US"/>
           </a:p>
@@ -1885,7 +1885,7 @@
           <a:p>
             <a:fld id="{A8B89F18-586E-4B97-8EEA-25E99A190A89}" type="datetimeFigureOut">
               <a:rPr lang="en-US" smtClean="0"/>
-              <a:t>9/19/2019</a:t>
+              <a:t>9/21/2019</a:t>
             </a:fld>
             <a:endParaRPr lang="en-US"/>
           </a:p>
@@ -2287,7 +2287,7 @@
           <a:p>
             <a:fld id="{A8B89F18-586E-4B97-8EEA-25E99A190A89}" type="datetimeFigureOut">
               <a:rPr lang="en-US" smtClean="0"/>
-              <a:t>9/19/2019</a:t>
+              <a:t>9/21/2019</a:t>
             </a:fld>
             <a:endParaRPr lang="en-US"/>
           </a:p>
@@ -2679,7 +2679,7 @@
           <a:p>
             <a:fld id="{A8B89F18-586E-4B97-8EEA-25E99A190A89}" type="datetimeFigureOut">
               <a:rPr lang="en-US" smtClean="0"/>
-              <a:t>9/19/2019</a:t>
+              <a:t>9/21/2019</a:t>
             </a:fld>
             <a:endParaRPr lang="en-US"/>
           </a:p>
@@ -3153,7 +3153,7 @@
           <a:p>
             <a:fld id="{A8B89F18-586E-4B97-8EEA-25E99A190A89}" type="datetimeFigureOut">
               <a:rPr lang="en-US" smtClean="0"/>
-              <a:t>9/19/2019</a:t>
+              <a:t>9/21/2019</a:t>
             </a:fld>
             <a:endParaRPr lang="en-US"/>
           </a:p>
@@ -3622,7 +3622,7 @@
           <a:p>
             <a:fld id="{A8B89F18-586E-4B97-8EEA-25E99A190A89}" type="datetimeFigureOut">
               <a:rPr lang="en-US" smtClean="0"/>
-              <a:t>9/19/2019</a:t>
+              <a:t>9/21/2019</a:t>
             </a:fld>
             <a:endParaRPr lang="en-US"/>
           </a:p>
@@ -4228,7 +4228,7 @@
           <a:p>
             <a:fld id="{A8B89F18-586E-4B97-8EEA-25E99A190A89}" type="datetimeFigureOut">
               <a:rPr lang="en-US" smtClean="0"/>
-              <a:t>9/19/2019</a:t>
+              <a:t>9/21/2019</a:t>
             </a:fld>
             <a:endParaRPr lang="en-US"/>
           </a:p>
@@ -4563,7 +4563,7 @@
           <a:p>
             <a:fld id="{A8B89F18-586E-4B97-8EEA-25E99A190A89}" type="datetimeFigureOut">
               <a:rPr lang="en-US" smtClean="0"/>
-              <a:t>9/19/2019</a:t>
+              <a:t>9/21/2019</a:t>
             </a:fld>
             <a:endParaRPr lang="en-US"/>
           </a:p>
@@ -4870,7 +4870,7 @@
           <a:p>
             <a:fld id="{A8B89F18-586E-4B97-8EEA-25E99A190A89}" type="datetimeFigureOut">
               <a:rPr lang="en-US" smtClean="0"/>
-              <a:t>9/19/2019</a:t>
+              <a:t>9/21/2019</a:t>
             </a:fld>
             <a:endParaRPr lang="en-US"/>
           </a:p>
@@ -5375,7 +5375,7 @@
           <a:p>
             <a:fld id="{A8B89F18-586E-4B97-8EEA-25E99A190A89}" type="datetimeFigureOut">
               <a:rPr lang="en-US" smtClean="0"/>
-              <a:t>9/19/2019</a:t>
+              <a:t>9/21/2019</a:t>
             </a:fld>
             <a:endParaRPr lang="en-US"/>
           </a:p>
@@ -5860,7 +5860,7 @@
           <a:p>
             <a:fld id="{A8B89F18-586E-4B97-8EEA-25E99A190A89}" type="datetimeFigureOut">
               <a:rPr lang="en-US" smtClean="0"/>
-              <a:t>9/19/2019</a:t>
+              <a:t>9/21/2019</a:t>
             </a:fld>
             <a:endParaRPr lang="en-US"/>
           </a:p>
@@ -6295,7 +6295,7 @@
           <a:p>
             <a:fld id="{A8B89F18-586E-4B97-8EEA-25E99A190A89}" type="datetimeFigureOut">
               <a:rPr lang="en-US" smtClean="0"/>
-              <a:t>9/19/2019</a:t>
+              <a:t>9/21/2019</a:t>
             </a:fld>
             <a:endParaRPr lang="en-US"/>
           </a:p>
@@ -8599,8 +8599,13 @@
           <a:p>
             <a:r>
               <a:rPr lang="en-US" dirty="0"/>
-              <a:t>Reason I came up with this season</a:t>
-            </a:r>
+              <a:t>Reason I came up with </a:t>
+            </a:r>
+            <a:r>
+              <a:rPr lang="en-US"/>
+              <a:t>this session</a:t>
+            </a:r>
+            <a:endParaRPr lang="en-US" dirty="0"/>
           </a:p>
         </p:txBody>
       </p:sp>

</xml_diff>